<commit_message>
added to ML slides.
</commit_message>
<xml_diff>
--- a/Beer Data Presentation.pptx
+++ b/Beer Data Presentation.pptx
@@ -5,7 +5,7 @@
     <p:sldMasterId id="2147483843" r:id="rId1"/>
   </p:sldMasterIdLst>
   <p:notesMasterIdLst>
-    <p:notesMasterId r:id="rId13"/>
+    <p:notesMasterId r:id="rId14"/>
   </p:notesMasterIdLst>
   <p:sldIdLst>
     <p:sldId id="256" r:id="rId2"/>
@@ -14,11 +14,12 @@
     <p:sldId id="265" r:id="rId5"/>
     <p:sldId id="270" r:id="rId6"/>
     <p:sldId id="271" r:id="rId7"/>
-    <p:sldId id="259" r:id="rId8"/>
-    <p:sldId id="267" r:id="rId9"/>
-    <p:sldId id="268" r:id="rId10"/>
-    <p:sldId id="269" r:id="rId11"/>
-    <p:sldId id="272" r:id="rId12"/>
+    <p:sldId id="273" r:id="rId8"/>
+    <p:sldId id="259" r:id="rId9"/>
+    <p:sldId id="267" r:id="rId10"/>
+    <p:sldId id="268" r:id="rId11"/>
+    <p:sldId id="269" r:id="rId12"/>
+    <p:sldId id="272" r:id="rId13"/>
   </p:sldIdLst>
   <p:sldSz cx="12192000" cy="6858000"/>
   <p:notesSz cx="6858000" cy="9144000"/>
@@ -4139,7 +4140,7 @@
 <dgm:dataModel xmlns:dgm="http://schemas.openxmlformats.org/drawingml/2006/diagram" xmlns:a="http://schemas.openxmlformats.org/drawingml/2006/main">
   <dgm:ptLst>
     <dgm:pt modelId="{39EA302D-0CB2-465F-91D6-A50F58DA7E91}" type="doc">
-      <dgm:prSet loTypeId="urn:microsoft.com/office/officeart/2016/7/layout/BasicProcessNew" loCatId="process" qsTypeId="urn:microsoft.com/office/officeart/2005/8/quickstyle/simple1" qsCatId="simple" csTypeId="urn:microsoft.com/office/officeart/2005/8/colors/colorful1" csCatId="colorful"/>
+      <dgm:prSet loTypeId="urn:microsoft.com/office/officeart/2016/7/layout/BasicProcessNew" loCatId="process" qsTypeId="urn:microsoft.com/office/officeart/2005/8/quickstyle/simple1" qsCatId="simple" csTypeId="urn:microsoft.com/office/officeart/2005/8/colors/colorful1" csCatId="colorful" phldr="1"/>
       <dgm:spPr/>
       <dgm:t>
         <a:bodyPr/>
@@ -4150,17 +4151,30 @@
       </dgm:t>
     </dgm:pt>
     <dgm:pt modelId="{288C9043-8D0A-4325-9DF3-79049C26F7AB}">
-      <dgm:prSet/>
+      <dgm:prSet custT="1"/>
       <dgm:spPr/>
       <dgm:t>
         <a:bodyPr/>
         <a:lstStyle/>
         <a:p>
+          <a:pPr>
+            <a:lnSpc>
+              <a:spcPct val="200000"/>
+            </a:lnSpc>
+          </a:pPr>
           <a:r>
-            <a:rPr lang="en-US" b="0" i="0"/>
-            <a:t>We are building a multi-class classification model that will analyze user preferences to determine preferred beer style and make recommendations.</a:t>
+            <a:rPr lang="en-US" sz="1400" b="0" i="0" dirty="0"/>
+            <a:t>We built a </a:t>
           </a:r>
-          <a:endParaRPr lang="en-US"/>
+          <a:r>
+            <a:rPr lang="en-US" sz="1400" b="1" i="0" dirty="0"/>
+            <a:t>multi-class classification </a:t>
+          </a:r>
+          <a:r>
+            <a:rPr lang="en-US" sz="1400" b="0" i="0" dirty="0"/>
+            <a:t>model that analyzes user preferences to determine preferred beer style and make recommendations.</a:t>
+          </a:r>
+          <a:endParaRPr lang="en-US" sz="1400" dirty="0"/>
         </a:p>
       </dgm:t>
     </dgm:pt>
@@ -4187,17 +4201,42 @@
       </dgm:t>
     </dgm:pt>
     <dgm:pt modelId="{B867D26C-E129-4606-9CA4-DA970EA02E05}">
-      <dgm:prSet/>
+      <dgm:prSet custT="1"/>
       <dgm:spPr/>
       <dgm:t>
         <a:bodyPr/>
         <a:lstStyle/>
         <a:p>
+          <a:pPr>
+            <a:lnSpc>
+              <a:spcPct val="200000"/>
+            </a:lnSpc>
+          </a:pPr>
           <a:r>
-            <a:rPr lang="en-US" b="0" i="0"/>
-            <a:t>Preliminary analysis and preprocessing involved analyzing variables (e.g., ABV, min./max. IBU, taste profile, review data, etc.) and grouping related data. A SQLite database was created to store several tables of related information such as taste data, review scores, and names &amp; breweries, creating a more organized source.</a:t>
+            <a:rPr lang="en-US" sz="1400" b="1" i="0" dirty="0"/>
+            <a:t>Preliminary analysis </a:t>
           </a:r>
-          <a:endParaRPr lang="en-US"/>
+          <a:r>
+            <a:rPr lang="en-US" sz="1400" b="0" i="0" dirty="0"/>
+            <a:t>and </a:t>
+          </a:r>
+          <a:r>
+            <a:rPr lang="en-US" sz="1400" b="1" i="0" dirty="0"/>
+            <a:t>preprocessing</a:t>
+          </a:r>
+          <a:r>
+            <a:rPr lang="en-US" sz="1400" b="0" i="0" dirty="0"/>
+            <a:t> involved analyzing variables and grouping related data. A </a:t>
+          </a:r>
+          <a:r>
+            <a:rPr lang="en-US" sz="1400" b="1" i="0" dirty="0"/>
+            <a:t>SQLite database </a:t>
+          </a:r>
+          <a:r>
+            <a:rPr lang="en-US" sz="1400" b="0" i="0" dirty="0"/>
+            <a:t>was created to store several tables of related information.</a:t>
+          </a:r>
+          <a:endParaRPr lang="en-US" sz="1400" dirty="0"/>
         </a:p>
       </dgm:t>
     </dgm:pt>
@@ -4224,17 +4263,86 @@
       </dgm:t>
     </dgm:pt>
     <dgm:pt modelId="{AD541E3C-D56A-4C82-A626-8594E56BB676}">
-      <dgm:prSet/>
+      <dgm:prSet custT="1"/>
       <dgm:spPr/>
       <dgm:t>
         <a:bodyPr/>
         <a:lstStyle/>
         <a:p>
+          <a:pPr>
+            <a:lnSpc>
+              <a:spcPct val="150000"/>
+            </a:lnSpc>
+          </a:pPr>
           <a:r>
-            <a:rPr lang="en-US" b="0" i="0"/>
-            <a:t>After building the database, there was further discussion about the direction of the project, at which point we decided the model would only learn from objective*, numerical data. This meant only taste profile (e.g., Astringency, Bitterness, Saltiness, etc.) and chemical composition (ABV, min./max. IBU) would be considered in the construction of the model, while review data and identifying information would be excluded. The choice was made with the belief that a model based on factual data would provide more significant output than one that considered more opinionated statistics such as review scores, which we believed were more volatile, and susceptible to outliers.</a:t>
+            <a:rPr lang="en-US" sz="1400" b="0" i="0" dirty="0"/>
+            <a:t>The model was trained on beer </a:t>
           </a:r>
-          <a:endParaRPr lang="en-US"/>
+          <a:r>
+            <a:rPr lang="en-US" sz="1400" b="0" i="1" u="sng" dirty="0"/>
+            <a:t>taste profile</a:t>
+          </a:r>
+          <a:r>
+            <a:rPr lang="en-US" sz="1400" b="0" i="1" u="none" dirty="0"/>
+            <a:t> </a:t>
+          </a:r>
+          <a:r>
+            <a:rPr lang="en-US" sz="1400" b="0" i="0" dirty="0"/>
+            <a:t>(e.g., </a:t>
+          </a:r>
+          <a:r>
+            <a:rPr lang="en-US" sz="1400" b="1" i="0" dirty="0"/>
+            <a:t>Astringency</a:t>
+          </a:r>
+          <a:r>
+            <a:rPr lang="en-US" sz="1400" b="0" i="0" dirty="0"/>
+            <a:t>, </a:t>
+          </a:r>
+          <a:r>
+            <a:rPr lang="en-US" sz="1400" b="1" i="0" dirty="0"/>
+            <a:t>Bitterness</a:t>
+          </a:r>
+          <a:r>
+            <a:rPr lang="en-US" sz="1400" b="0" i="0" dirty="0"/>
+            <a:t>, </a:t>
+          </a:r>
+          <a:r>
+            <a:rPr lang="en-US" sz="1400" b="1" i="0" dirty="0"/>
+            <a:t>Saltiness</a:t>
+          </a:r>
+          <a:r>
+            <a:rPr lang="en-US" sz="1400" b="0" i="0" dirty="0"/>
+            <a:t>, etc.) and </a:t>
+          </a:r>
+          <a:r>
+            <a:rPr lang="en-US" sz="1400" b="0" i="1" u="sng" dirty="0"/>
+            <a:t>chemical composition</a:t>
+          </a:r>
+          <a:r>
+            <a:rPr lang="en-US" sz="1400" b="0" i="1" u="none" dirty="0"/>
+            <a:t> </a:t>
+          </a:r>
+          <a:r>
+            <a:rPr lang="en-US" sz="1400" b="0" i="0" dirty="0"/>
+            <a:t>(</a:t>
+          </a:r>
+          <a:r>
+            <a:rPr lang="en-US" sz="1400" b="1" i="0" dirty="0"/>
+            <a:t>ABV</a:t>
+          </a:r>
+          <a:r>
+            <a:rPr lang="en-US" sz="1400" b="0" i="0" dirty="0"/>
+            <a:t>, </a:t>
+          </a:r>
+          <a:r>
+            <a:rPr lang="en-US" sz="1400" b="1" i="0" dirty="0"/>
+            <a:t>min./max. IBU</a:t>
+          </a:r>
+          <a:r>
+            <a:rPr lang="en-US" sz="1400" b="0" i="0" dirty="0"/>
+            <a:t>) would be considered in the construction of the model, while more opinionated statistics like review scores, were excluded.</a:t>
+          </a:r>
+          <a:endParaRPr lang="en-US" sz="1400" dirty="0"/>
         </a:p>
       </dgm:t>
     </dgm:pt>
@@ -4322,8 +4430,8 @@
     <dgm:cxn modelId="{3222D322-E1D8-D946-8C2F-40A8F5A06571}" type="presOf" srcId="{FA0F569D-6379-4277-BBAA-FEFDDADD52CE}" destId="{6C662624-8432-164A-9E2F-B5077B2229EC}" srcOrd="0" destOrd="0" presId="urn:microsoft.com/office/officeart/2016/7/layout/BasicProcessNew"/>
     <dgm:cxn modelId="{942C8425-2714-204F-BAA5-AEA5F22BA3BE}" type="presOf" srcId="{0575440D-2C2C-4F57-A79F-273119BB1856}" destId="{829A7CB5-2C9C-C142-8DDF-4C69A4212E8F}" srcOrd="0" destOrd="0" presId="urn:microsoft.com/office/officeart/2016/7/layout/BasicProcessNew"/>
     <dgm:cxn modelId="{75F98E33-17B5-1A4D-97AF-165175870B70}" type="presOf" srcId="{39EA302D-0CB2-465F-91D6-A50F58DA7E91}" destId="{C8F917EA-82CD-424A-946D-B931D1FB6BA4}" srcOrd="0" destOrd="0" presId="urn:microsoft.com/office/officeart/2016/7/layout/BasicProcessNew"/>
+    <dgm:cxn modelId="{4B24D674-F990-4406-8948-EC1F22C88011}" srcId="{39EA302D-0CB2-465F-91D6-A50F58DA7E91}" destId="{B867D26C-E129-4606-9CA4-DA970EA02E05}" srcOrd="1" destOrd="0" parTransId="{43CCBD58-6305-42F1-95BC-8CBF310BC35A}" sibTransId="{0575440D-2C2C-4F57-A79F-273119BB1856}"/>
     <dgm:cxn modelId="{74805357-2D61-488D-ADF3-242CC998041D}" srcId="{39EA302D-0CB2-465F-91D6-A50F58DA7E91}" destId="{288C9043-8D0A-4325-9DF3-79049C26F7AB}" srcOrd="0" destOrd="0" parTransId="{4622D0D9-B011-46A8-B8A1-B1E100ABD785}" sibTransId="{FA0F569D-6379-4277-BBAA-FEFDDADD52CE}"/>
-    <dgm:cxn modelId="{4B24D674-F990-4406-8948-EC1F22C88011}" srcId="{39EA302D-0CB2-465F-91D6-A50F58DA7E91}" destId="{B867D26C-E129-4606-9CA4-DA970EA02E05}" srcOrd="1" destOrd="0" parTransId="{43CCBD58-6305-42F1-95BC-8CBF310BC35A}" sibTransId="{0575440D-2C2C-4F57-A79F-273119BB1856}"/>
     <dgm:cxn modelId="{B099807D-600C-491D-BB1F-EF0C019A0338}" srcId="{39EA302D-0CB2-465F-91D6-A50F58DA7E91}" destId="{AD541E3C-D56A-4C82-A626-8594E56BB676}" srcOrd="2" destOrd="0" parTransId="{3870CA0E-8810-417D-BE08-083BE8C5C1ED}" sibTransId="{9B724515-109E-4C4B-AA64-AF1AF7A36CCA}"/>
     <dgm:cxn modelId="{F8ABE494-8E02-314A-8013-B9A38E8CC6B2}" type="presOf" srcId="{B867D26C-E129-4606-9CA4-DA970EA02E05}" destId="{9D81BA3A-788E-8D4C-96FF-8A5123CB8C3C}" srcOrd="0" destOrd="0" presId="urn:microsoft.com/office/officeart/2016/7/layout/BasicProcessNew"/>
     <dgm:cxn modelId="{1BB83BAE-0A43-0A4B-AF63-27E6DB0AFE6B}" type="presOf" srcId="{AD541E3C-D56A-4C82-A626-8594E56BB676}" destId="{EBF4B65B-72C2-BA41-9E4D-FF7258A4F0A7}" srcOrd="0" destOrd="0" presId="urn:microsoft.com/office/officeart/2016/7/layout/BasicProcessNew"/>
@@ -4570,8 +4678,8 @@
     <dgm:cxn modelId="{94A5BC24-B6A6-4BC5-8BBC-24F9C835426E}" srcId="{7D377A41-BD8A-4632-8229-AEEADE984D4B}" destId="{6061F520-E74E-418C-AEA1-766D5DC68396}" srcOrd="0" destOrd="0" parTransId="{6B18C700-CB96-46FD-BC5F-E8F73585B1C7}" sibTransId="{C54F2E61-4653-460F-A799-81232E395218}"/>
     <dgm:cxn modelId="{01DF0E37-0542-2D48-BFAC-22AE7E6EDC3B}" type="presOf" srcId="{30531C89-6263-4FB0-92CD-3129FB4EDD32}" destId="{65F3F1EA-0A7E-3F4D-8298-CE34E3793488}" srcOrd="0" destOrd="0" presId="urn:microsoft.com/office/officeart/2005/8/layout/matrix3"/>
     <dgm:cxn modelId="{B73D3444-A11F-4B67-9D3E-2F231D791E3A}" srcId="{7D377A41-BD8A-4632-8229-AEEADE984D4B}" destId="{30531C89-6263-4FB0-92CD-3129FB4EDD32}" srcOrd="1" destOrd="0" parTransId="{8FCEE521-B79E-45AE-B335-07F4C5095728}" sibTransId="{6ABBBE54-B4DF-4B73-A3F6-B4461A3EB795}"/>
+    <dgm:cxn modelId="{BBA6EB67-35EB-CE4A-8A0E-7291C67A1AC6}" type="presOf" srcId="{6061F520-E74E-418C-AEA1-766D5DC68396}" destId="{03C8D895-0216-0E4D-94E2-C676EB1F6007}" srcOrd="0" destOrd="0" presId="urn:microsoft.com/office/officeart/2005/8/layout/matrix3"/>
     <dgm:cxn modelId="{CDC7A655-6E70-C74A-9CEF-6F01377C65EC}" type="presOf" srcId="{7D377A41-BD8A-4632-8229-AEEADE984D4B}" destId="{DE627B24-C2DC-CD4E-8958-DAE0B7EFB9D1}" srcOrd="0" destOrd="0" presId="urn:microsoft.com/office/officeart/2005/8/layout/matrix3"/>
-    <dgm:cxn modelId="{BBA6EB67-35EB-CE4A-8A0E-7291C67A1AC6}" type="presOf" srcId="{6061F520-E74E-418C-AEA1-766D5DC68396}" destId="{03C8D895-0216-0E4D-94E2-C676EB1F6007}" srcOrd="0" destOrd="0" presId="urn:microsoft.com/office/officeart/2005/8/layout/matrix3"/>
     <dgm:cxn modelId="{A8B467B8-30C1-974D-95D6-04D7139B8BA2}" type="presOf" srcId="{1F4833C8-6F2A-435B-9890-C6BBB65232FD}" destId="{520E108F-6AF1-8F47-995A-18EBC6470C14}" srcOrd="0" destOrd="0" presId="urn:microsoft.com/office/officeart/2005/8/layout/matrix3"/>
     <dgm:cxn modelId="{203DB9DE-BCDE-4941-BB0B-8FCF8956648D}" srcId="{7D377A41-BD8A-4632-8229-AEEADE984D4B}" destId="{1F4833C8-6F2A-435B-9890-C6BBB65232FD}" srcOrd="3" destOrd="0" parTransId="{AB595A8D-6A2F-43FE-98F5-AC5C282D8917}" sibTransId="{0B9B1254-455D-4170-9900-4C8AFD672825}"/>
     <dgm:cxn modelId="{C0FB53F5-547A-4380-ABA2-16976D5D5B37}" srcId="{7D377A41-BD8A-4632-8229-AEEADE984D4B}" destId="{B75AB08F-4364-4A00-AB4E-53C43D868DFF}" srcOrd="2" destOrd="0" parTransId="{F2ACF6A3-6566-4A19-B753-FDEF6790D677}" sibTransId="{6D84949E-6A8E-4B73-95C9-BB8ADABA0197}"/>
@@ -5348,8 +5456,8 @@
       </dsp:nvSpPr>
       <dsp:spPr>
         <a:xfrm>
-          <a:off x="7379" y="33820"/>
-          <a:ext cx="2795950" cy="3093019"/>
+          <a:off x="11978" y="0"/>
+          <a:ext cx="2793219" cy="3160661"/>
         </a:xfrm>
         <a:prstGeom prst="rect">
           <a:avLst/>
@@ -5395,9 +5503,9 @@
         </a:bodyPr>
         <a:lstStyle/>
         <a:p>
-          <a:pPr marL="0" lvl="0" indent="0" algn="ctr" defTabSz="488950">
+          <a:pPr marL="0" lvl="0" indent="0" algn="ctr" defTabSz="622300">
             <a:lnSpc>
-              <a:spcPct val="90000"/>
+              <a:spcPct val="200000"/>
             </a:lnSpc>
             <a:spcBef>
               <a:spcPct val="0"/>
@@ -5408,15 +5516,23 @@
             <a:buNone/>
           </a:pPr>
           <a:r>
-            <a:rPr lang="en-US" sz="1100" b="0" i="0" kern="1200"/>
-            <a:t>We are building a multi-class classification model that will analyze user preferences to determine preferred beer style and make recommendations.</a:t>
+            <a:rPr lang="en-US" sz="1400" b="0" i="0" kern="1200" dirty="0"/>
+            <a:t>We built a </a:t>
           </a:r>
-          <a:endParaRPr lang="en-US" sz="1100" kern="1200"/>
+          <a:r>
+            <a:rPr lang="en-US" sz="1400" b="1" i="0" kern="1200" dirty="0"/>
+            <a:t>multi-class classification </a:t>
+          </a:r>
+          <a:r>
+            <a:rPr lang="en-US" sz="1400" b="0" i="0" kern="1200" dirty="0"/>
+            <a:t>model that analyzes user preferences to determine preferred beer style and make recommendations.</a:t>
+          </a:r>
+          <a:endParaRPr lang="en-US" sz="1400" kern="1200" dirty="0"/>
         </a:p>
       </dsp:txBody>
       <dsp:txXfrm>
-        <a:off x="7379" y="33820"/>
-        <a:ext cx="2795950" cy="3093019"/>
+        <a:off x="11978" y="0"/>
+        <a:ext cx="2793219" cy="3160661"/>
       </dsp:txXfrm>
     </dsp:sp>
     <dsp:sp modelId="{6C662624-8432-164A-9E2F-B5077B2229EC}">
@@ -5426,8 +5542,8 @@
       </dsp:nvSpPr>
       <dsp:spPr>
         <a:xfrm>
-          <a:off x="2851344" y="1458830"/>
-          <a:ext cx="419392" cy="243000"/>
+          <a:off x="2853165" y="1458830"/>
+          <a:ext cx="418982" cy="243000"/>
         </a:xfrm>
         <a:prstGeom prst="rightArrow">
           <a:avLst>
@@ -5478,8 +5594,8 @@
       </dsp:nvSpPr>
       <dsp:spPr>
         <a:xfrm>
-          <a:off x="3318751" y="33820"/>
-          <a:ext cx="2795950" cy="3093019"/>
+          <a:off x="3320116" y="0"/>
+          <a:ext cx="2793219" cy="3160661"/>
         </a:xfrm>
         <a:prstGeom prst="rect">
           <a:avLst/>
@@ -5525,9 +5641,9 @@
         </a:bodyPr>
         <a:lstStyle/>
         <a:p>
-          <a:pPr marL="0" lvl="0" indent="0" algn="ctr" defTabSz="488950">
+          <a:pPr marL="0" lvl="0" indent="0" algn="ctr" defTabSz="622300">
             <a:lnSpc>
-              <a:spcPct val="90000"/>
+              <a:spcPct val="200000"/>
             </a:lnSpc>
             <a:spcBef>
               <a:spcPct val="0"/>
@@ -5538,15 +5654,35 @@
             <a:buNone/>
           </a:pPr>
           <a:r>
-            <a:rPr lang="en-US" sz="1100" b="0" i="0" kern="1200"/>
-            <a:t>Preliminary analysis and preprocessing involved analyzing variables (e.g., ABV, min./max. IBU, taste profile, review data, etc.) and grouping related data. A SQLite database was created to store several tables of related information such as taste data, review scores, and names &amp; breweries, creating a more organized source.</a:t>
+            <a:rPr lang="en-US" sz="1400" b="1" i="0" kern="1200" dirty="0"/>
+            <a:t>Preliminary analysis </a:t>
           </a:r>
-          <a:endParaRPr lang="en-US" sz="1100" kern="1200"/>
+          <a:r>
+            <a:rPr lang="en-US" sz="1400" b="0" i="0" kern="1200" dirty="0"/>
+            <a:t>and </a:t>
+          </a:r>
+          <a:r>
+            <a:rPr lang="en-US" sz="1400" b="1" i="0" kern="1200" dirty="0"/>
+            <a:t>preprocessing</a:t>
+          </a:r>
+          <a:r>
+            <a:rPr lang="en-US" sz="1400" b="0" i="0" kern="1200" dirty="0"/>
+            <a:t> involved analyzing variables and grouping related data. A </a:t>
+          </a:r>
+          <a:r>
+            <a:rPr lang="en-US" sz="1400" b="1" i="0" kern="1200" dirty="0"/>
+            <a:t>SQLite database </a:t>
+          </a:r>
+          <a:r>
+            <a:rPr lang="en-US" sz="1400" b="0" i="0" kern="1200" dirty="0"/>
+            <a:t>was created to store several tables of related information.</a:t>
+          </a:r>
+          <a:endParaRPr lang="en-US" sz="1400" kern="1200" dirty="0"/>
         </a:p>
       </dsp:txBody>
       <dsp:txXfrm>
-        <a:off x="3318751" y="33820"/>
-        <a:ext cx="2795950" cy="3093019"/>
+        <a:off x="3320116" y="0"/>
+        <a:ext cx="2793219" cy="3160661"/>
       </dsp:txXfrm>
     </dsp:sp>
     <dsp:sp modelId="{829A7CB5-2C9C-C142-8DDF-4C69A4212E8F}">
@@ -5556,8 +5692,8 @@
       </dsp:nvSpPr>
       <dsp:spPr>
         <a:xfrm>
-          <a:off x="6162716" y="1458830"/>
-          <a:ext cx="419392" cy="243000"/>
+          <a:off x="6161304" y="1458830"/>
+          <a:ext cx="418982" cy="243000"/>
         </a:xfrm>
         <a:prstGeom prst="rightArrow">
           <a:avLst>
@@ -5608,8 +5744,8 @@
       </dsp:nvSpPr>
       <dsp:spPr>
         <a:xfrm>
-          <a:off x="6630123" y="33820"/>
-          <a:ext cx="2795950" cy="3093019"/>
+          <a:off x="6628254" y="0"/>
+          <a:ext cx="2793219" cy="3160661"/>
         </a:xfrm>
         <a:prstGeom prst="rect">
           <a:avLst/>
@@ -5655,9 +5791,9 @@
         </a:bodyPr>
         <a:lstStyle/>
         <a:p>
-          <a:pPr marL="0" lvl="0" indent="0" algn="ctr" defTabSz="488950">
+          <a:pPr marL="0" lvl="0" indent="0" algn="ctr" defTabSz="622300">
             <a:lnSpc>
-              <a:spcPct val="90000"/>
+              <a:spcPct val="150000"/>
             </a:lnSpc>
             <a:spcBef>
               <a:spcPct val="0"/>
@@ -5668,15 +5804,79 @@
             <a:buNone/>
           </a:pPr>
           <a:r>
-            <a:rPr lang="en-US" sz="1100" b="0" i="0" kern="1200"/>
-            <a:t>After building the database, there was further discussion about the direction of the project, at which point we decided the model would only learn from objective*, numerical data. This meant only taste profile (e.g., Astringency, Bitterness, Saltiness, etc.) and chemical composition (ABV, min./max. IBU) would be considered in the construction of the model, while review data and identifying information would be excluded. The choice was made with the belief that a model based on factual data would provide more significant output than one that considered more opinionated statistics such as review scores, which we believed were more volatile, and susceptible to outliers.</a:t>
+            <a:rPr lang="en-US" sz="1400" b="0" i="0" kern="1200" dirty="0"/>
+            <a:t>The model was trained on beer </a:t>
           </a:r>
-          <a:endParaRPr lang="en-US" sz="1100" kern="1200"/>
+          <a:r>
+            <a:rPr lang="en-US" sz="1400" b="0" i="1" u="sng" kern="1200" dirty="0"/>
+            <a:t>taste profile</a:t>
+          </a:r>
+          <a:r>
+            <a:rPr lang="en-US" sz="1400" b="0" i="1" u="none" kern="1200" dirty="0"/>
+            <a:t> </a:t>
+          </a:r>
+          <a:r>
+            <a:rPr lang="en-US" sz="1400" b="0" i="0" kern="1200" dirty="0"/>
+            <a:t>(e.g., </a:t>
+          </a:r>
+          <a:r>
+            <a:rPr lang="en-US" sz="1400" b="1" i="0" kern="1200" dirty="0"/>
+            <a:t>Astringency</a:t>
+          </a:r>
+          <a:r>
+            <a:rPr lang="en-US" sz="1400" b="0" i="0" kern="1200" dirty="0"/>
+            <a:t>, </a:t>
+          </a:r>
+          <a:r>
+            <a:rPr lang="en-US" sz="1400" b="1" i="0" kern="1200" dirty="0"/>
+            <a:t>Bitterness</a:t>
+          </a:r>
+          <a:r>
+            <a:rPr lang="en-US" sz="1400" b="0" i="0" kern="1200" dirty="0"/>
+            <a:t>, </a:t>
+          </a:r>
+          <a:r>
+            <a:rPr lang="en-US" sz="1400" b="1" i="0" kern="1200" dirty="0"/>
+            <a:t>Saltiness</a:t>
+          </a:r>
+          <a:r>
+            <a:rPr lang="en-US" sz="1400" b="0" i="0" kern="1200" dirty="0"/>
+            <a:t>, etc.) and </a:t>
+          </a:r>
+          <a:r>
+            <a:rPr lang="en-US" sz="1400" b="0" i="1" u="sng" kern="1200" dirty="0"/>
+            <a:t>chemical composition</a:t>
+          </a:r>
+          <a:r>
+            <a:rPr lang="en-US" sz="1400" b="0" i="1" u="none" kern="1200" dirty="0"/>
+            <a:t> </a:t>
+          </a:r>
+          <a:r>
+            <a:rPr lang="en-US" sz="1400" b="0" i="0" kern="1200" dirty="0"/>
+            <a:t>(</a:t>
+          </a:r>
+          <a:r>
+            <a:rPr lang="en-US" sz="1400" b="1" i="0" kern="1200" dirty="0"/>
+            <a:t>ABV</a:t>
+          </a:r>
+          <a:r>
+            <a:rPr lang="en-US" sz="1400" b="0" i="0" kern="1200" dirty="0"/>
+            <a:t>, </a:t>
+          </a:r>
+          <a:r>
+            <a:rPr lang="en-US" sz="1400" b="1" i="0" kern="1200" dirty="0"/>
+            <a:t>min./max. IBU</a:t>
+          </a:r>
+          <a:r>
+            <a:rPr lang="en-US" sz="1400" b="0" i="0" kern="1200" dirty="0"/>
+            <a:t>) would be considered in the construction of the model, while more opinionated statistics like review scores, were excluded.</a:t>
+          </a:r>
+          <a:endParaRPr lang="en-US" sz="1400" kern="1200" dirty="0"/>
         </a:p>
       </dsp:txBody>
       <dsp:txXfrm>
-        <a:off x="6630123" y="33820"/>
-        <a:ext cx="2795950" cy="3093019"/>
+        <a:off x="6628254" y="0"/>
+        <a:ext cx="2793219" cy="3160661"/>
       </dsp:txXfrm>
     </dsp:sp>
   </dsp:spTree>
@@ -11581,7 +11781,7 @@
           <a:p>
             <a:fld id="{0285C6D6-AE2B-6E42-9D78-EFC43A905F20}" type="datetimeFigureOut">
               <a:rPr lang="en-US" smtClean="0"/>
-              <a:t>11/15/22</a:t>
+              <a:t>11/17/2022</a:t>
             </a:fld>
             <a:endParaRPr lang="en-US"/>
           </a:p>
@@ -12290,7 +12490,7 @@
           <a:p>
             <a:fld id="{78ABE3C1-DBE1-495D-B57B-2849774B866A}" type="datetimeFigureOut">
               <a:rPr lang="en-US" smtClean="0"/>
-              <a:t>11/15/22</a:t>
+              <a:t>11/17/2022</a:t>
             </a:fld>
             <a:endParaRPr lang="en-US" dirty="0"/>
           </a:p>
@@ -12704,7 +12904,7 @@
           <a:p>
             <a:fld id="{9D6E9DEC-419B-4CC5-A080-3B06BD5A8291}" type="datetimeFigureOut">
               <a:rPr lang="en-US" smtClean="0"/>
-              <a:t>11/15/22</a:t>
+              <a:t>11/17/2022</a:t>
             </a:fld>
             <a:endParaRPr lang="en-US" dirty="0"/>
           </a:p>
@@ -13042,7 +13242,7 @@
           <a:p>
             <a:fld id="{9D6E9DEC-419B-4CC5-A080-3B06BD5A8291}" type="datetimeFigureOut">
               <a:rPr lang="en-US" smtClean="0"/>
-              <a:t>11/15/22</a:t>
+              <a:t>11/17/2022</a:t>
             </a:fld>
             <a:endParaRPr lang="en-US" dirty="0"/>
           </a:p>
@@ -13449,7 +13649,7 @@
           <a:p>
             <a:fld id="{9D6E9DEC-419B-4CC5-A080-3B06BD5A8291}" type="datetimeFigureOut">
               <a:rPr lang="en-US" smtClean="0"/>
-              <a:t>11/15/22</a:t>
+              <a:t>11/17/2022</a:t>
             </a:fld>
             <a:endParaRPr lang="en-US" dirty="0"/>
           </a:p>
@@ -14019,7 +14219,7 @@
           <a:p>
             <a:fld id="{9D6E9DEC-419B-4CC5-A080-3B06BD5A8291}" type="datetimeFigureOut">
               <a:rPr lang="en-US" smtClean="0"/>
-              <a:t>11/15/22</a:t>
+              <a:t>11/17/2022</a:t>
             </a:fld>
             <a:endParaRPr lang="en-US" dirty="0"/>
           </a:p>
@@ -14702,7 +14902,7 @@
           <a:p>
             <a:fld id="{9D6E9DEC-419B-4CC5-A080-3B06BD5A8291}" type="datetimeFigureOut">
               <a:rPr lang="en-US" smtClean="0"/>
-              <a:t>11/15/22</a:t>
+              <a:t>11/17/2022</a:t>
             </a:fld>
             <a:endParaRPr lang="en-US" dirty="0"/>
           </a:p>
@@ -15617,7 +15817,7 @@
           <a:p>
             <a:fld id="{9D6E9DEC-419B-4CC5-A080-3B06BD5A8291}" type="datetimeFigureOut">
               <a:rPr lang="en-US" smtClean="0"/>
-              <a:t>11/15/22</a:t>
+              <a:t>11/17/2022</a:t>
             </a:fld>
             <a:endParaRPr lang="en-US" dirty="0"/>
           </a:p>
@@ -15932,7 +16132,7 @@
           <a:p>
             <a:fld id="{1FA3F48C-C7C6-4055-9F49-3777875E72AE}" type="datetimeFigureOut">
               <a:rPr lang="en-US" smtClean="0"/>
-              <a:t>11/15/22</a:t>
+              <a:t>11/17/2022</a:t>
             </a:fld>
             <a:endParaRPr lang="en-US" dirty="0"/>
           </a:p>
@@ -16196,7 +16396,7 @@
           <a:p>
             <a:fld id="{6178E61D-D431-422C-9764-11DAFE33AB63}" type="datetimeFigureOut">
               <a:rPr lang="en-US" smtClean="0"/>
-              <a:t>11/15/22</a:t>
+              <a:t>11/17/2022</a:t>
             </a:fld>
             <a:endParaRPr lang="en-US" dirty="0"/>
           </a:p>
@@ -16520,7 +16720,7 @@
           <a:p>
             <a:fld id="{12DE42F4-6EEF-4EF7-8ED4-2208F0F89A08}" type="datetimeFigureOut">
               <a:rPr lang="en-US" smtClean="0"/>
-              <a:t>11/15/22</a:t>
+              <a:t>11/17/2022</a:t>
             </a:fld>
             <a:endParaRPr lang="en-US" dirty="0"/>
           </a:p>
@@ -16909,7 +17109,7 @@
           <a:p>
             <a:fld id="{30578ACC-22D6-47C1-A373-4FD133E34F3C}" type="datetimeFigureOut">
               <a:rPr lang="en-US" smtClean="0"/>
-              <a:t>11/15/22</a:t>
+              <a:t>11/17/2022</a:t>
             </a:fld>
             <a:endParaRPr lang="en-US" dirty="0"/>
           </a:p>
@@ -17285,7 +17485,7 @@
           <a:p>
             <a:fld id="{4E5A6C69-6797-4E8A-BF37-F2C3751466E9}" type="datetimeFigureOut">
               <a:rPr lang="en-US" smtClean="0"/>
-              <a:t>11/15/22</a:t>
+              <a:t>11/17/2022</a:t>
             </a:fld>
             <a:endParaRPr lang="en-US" dirty="0"/>
           </a:p>
@@ -17791,7 +17991,7 @@
           <a:p>
             <a:fld id="{D82014A1-A632-4878-A0D3-F52BA7563730}" type="datetimeFigureOut">
               <a:rPr lang="en-US" smtClean="0"/>
-              <a:t>11/15/22</a:t>
+              <a:t>11/17/2022</a:t>
             </a:fld>
             <a:endParaRPr lang="en-US" dirty="0"/>
           </a:p>
@@ -18048,7 +18248,7 @@
           <a:p>
             <a:fld id="{CE99F462-093F-4566-844B-4C71F2739DA5}" type="datetimeFigureOut">
               <a:rPr lang="en-US" smtClean="0"/>
-              <a:t>11/15/22</a:t>
+              <a:t>11/17/2022</a:t>
             </a:fld>
             <a:endParaRPr lang="en-US" dirty="0"/>
           </a:p>
@@ -18211,7 +18411,7 @@
           <a:p>
             <a:fld id="{3D24A7AC-904D-4781-85BA-7D10C17ED021}" type="datetimeFigureOut">
               <a:rPr lang="en-US" smtClean="0"/>
-              <a:t>11/15/22</a:t>
+              <a:t>11/17/2022</a:t>
             </a:fld>
             <a:endParaRPr lang="en-US" dirty="0"/>
           </a:p>
@@ -18601,7 +18801,7 @@
           <a:p>
             <a:fld id="{E331444B-B92B-4E27-8C94-BB93EAF5CB18}" type="datetimeFigureOut">
               <a:rPr lang="en-US" smtClean="0"/>
-              <a:t>11/15/22</a:t>
+              <a:t>11/17/2022</a:t>
             </a:fld>
             <a:endParaRPr lang="en-US" dirty="0"/>
           </a:p>
@@ -19010,7 +19210,7 @@
           <a:p>
             <a:fld id="{363EFA5E-FA76-400D-B3DC-F0BA90E6D107}" type="datetimeFigureOut">
               <a:rPr lang="en-US" smtClean="0"/>
-              <a:t>11/15/22</a:t>
+              <a:t>11/17/2022</a:t>
             </a:fld>
             <a:endParaRPr lang="en-US" dirty="0"/>
           </a:p>
@@ -19254,7 +19454,7 @@
           <a:p>
             <a:fld id="{9D6E9DEC-419B-4CC5-A080-3B06BD5A8291}" type="datetimeFigureOut">
               <a:rPr lang="en-US" smtClean="0"/>
-              <a:t>11/15/22</a:t>
+              <a:t>11/17/2022</a:t>
             </a:fld>
             <a:endParaRPr lang="en-US" dirty="0"/>
           </a:p>
@@ -20058,6 +20258,151 @@
       </p:grpSpPr>
       <p:pic>
         <p:nvPicPr>
+          <p:cNvPr id="3" name="slide3" descr="Most_Popular_Breweries">
+            <a:extLst>
+              <a:ext uri="{FF2B5EF4-FFF2-40B4-BE49-F238E27FC236}">
+                <a16:creationId xmlns:a16="http://schemas.microsoft.com/office/drawing/2014/main" id="{F23DE759-4EFB-4947-A06B-DBA58F7D0FAF}"/>
+              </a:ext>
+            </a:extLst>
+          </p:cNvPr>
+          <p:cNvPicPr>
+            <a:picLocks noChangeAspect="1"/>
+          </p:cNvPicPr>
+          <p:nvPr/>
+        </p:nvPicPr>
+        <p:blipFill>
+          <a:blip r:embed="rId2">
+            <a:extLst>
+              <a:ext uri="{28A0092B-C50C-407E-A947-70E740481C1C}">
+                <a14:useLocalDpi xmlns:a14="http://schemas.microsoft.com/office/drawing/2010/main" val="0"/>
+              </a:ext>
+            </a:extLst>
+          </a:blip>
+          <a:stretch>
+            <a:fillRect/>
+          </a:stretch>
+        </p:blipFill>
+        <p:spPr>
+          <a:xfrm>
+            <a:off x="0" y="1268135"/>
+            <a:ext cx="12192000" cy="5352473"/>
+          </a:xfrm>
+          <a:prstGeom prst="rect">
+            <a:avLst/>
+          </a:prstGeom>
+        </p:spPr>
+      </p:pic>
+      <p:sp>
+        <p:nvSpPr>
+          <p:cNvPr id="2" name="TextBox 1">
+            <a:extLst>
+              <a:ext uri="{FF2B5EF4-FFF2-40B4-BE49-F238E27FC236}">
+                <a16:creationId xmlns:a16="http://schemas.microsoft.com/office/drawing/2014/main" id="{104ABFC8-8FA2-14D4-CEEB-795D2FF325EB}"/>
+              </a:ext>
+            </a:extLst>
+          </p:cNvPr>
+          <p:cNvSpPr txBox="1"/>
+          <p:nvPr/>
+        </p:nvSpPr>
+        <p:spPr>
+          <a:xfrm>
+            <a:off x="0" y="81454"/>
+            <a:ext cx="6340197" cy="369332"/>
+          </a:xfrm>
+          <a:prstGeom prst="rect">
+            <a:avLst/>
+          </a:prstGeom>
+          <a:noFill/>
+        </p:spPr>
+        <p:txBody>
+          <a:bodyPr wrap="none" rtlCol="0">
+            <a:spAutoFit/>
+          </a:bodyPr>
+          <a:lstStyle/>
+          <a:p>
+            <a:r>
+              <a:rPr lang="en-US" dirty="0">
+                <a:ln w="0"/>
+                <a:effectLst>
+                  <a:outerShdw blurRad="38100" dist="19050" dir="2700000" algn="tl" rotWithShape="0">
+                    <a:schemeClr val="dk1">
+                      <a:alpha val="40000"/>
+                    </a:schemeClr>
+                  </a:outerShdw>
+                </a:effectLst>
+              </a:rPr>
+              <a:t>Most popular Breweries based on reviews from the dataset.</a:t>
+            </a:r>
+          </a:p>
+        </p:txBody>
+      </p:sp>
+      <p:sp>
+        <p:nvSpPr>
+          <p:cNvPr id="4" name="TextBox 3">
+            <a:extLst>
+              <a:ext uri="{FF2B5EF4-FFF2-40B4-BE49-F238E27FC236}">
+                <a16:creationId xmlns:a16="http://schemas.microsoft.com/office/drawing/2014/main" id="{40C78AD8-573B-747A-7846-5474E7BF4A79}"/>
+              </a:ext>
+            </a:extLst>
+          </p:cNvPr>
+          <p:cNvSpPr txBox="1"/>
+          <p:nvPr/>
+        </p:nvSpPr>
+        <p:spPr>
+          <a:xfrm>
+            <a:off x="0" y="651421"/>
+            <a:ext cx="6500191" cy="584775"/>
+          </a:xfrm>
+          <a:prstGeom prst="rect">
+            <a:avLst/>
+          </a:prstGeom>
+          <a:noFill/>
+        </p:spPr>
+        <p:txBody>
+          <a:bodyPr wrap="square" rtlCol="0">
+            <a:spAutoFit/>
+          </a:bodyPr>
+          <a:lstStyle/>
+          <a:p>
+            <a:r>
+              <a:rPr lang="en-US" sz="1600" dirty="0"/>
+              <a:t>Most popular Breweries based on review scores using a 4-5 point scale. Showing the top 25 in this category.</a:t>
+            </a:r>
+          </a:p>
+        </p:txBody>
+      </p:sp>
+    </p:spTree>
+    <p:extLst>
+      <p:ext uri="{BB962C8B-B14F-4D97-AF65-F5344CB8AC3E}">
+        <p14:creationId xmlns:p14="http://schemas.microsoft.com/office/powerpoint/2010/main" val="2238622656"/>
+      </p:ext>
+    </p:extLst>
+  </p:cSld>
+  <p:clrMapOvr>
+    <a:masterClrMapping/>
+  </p:clrMapOvr>
+</p:sld>
+</file>
+
+<file path=ppt/slides/slide11.xml><?xml version="1.0" encoding="utf-8"?>
+<p:sld xmlns:a="http://schemas.openxmlformats.org/drawingml/2006/main" xmlns:r="http://schemas.openxmlformats.org/officeDocument/2006/relationships" xmlns:p="http://schemas.openxmlformats.org/presentationml/2006/main">
+  <p:cSld>
+    <p:spTree>
+      <p:nvGrpSpPr>
+        <p:cNvPr id="1" name=""/>
+        <p:cNvGrpSpPr/>
+        <p:nvPr/>
+      </p:nvGrpSpPr>
+      <p:grpSpPr>
+        <a:xfrm>
+          <a:off x="0" y="0"/>
+          <a:ext cx="0" cy="0"/>
+          <a:chOff x="0" y="0"/>
+          <a:chExt cx="0" cy="0"/>
+        </a:xfrm>
+      </p:grpSpPr>
+      <p:pic>
+        <p:nvPicPr>
           <p:cNvPr id="4" name="slide4" descr="Most_popular_flavor_profile">
             <a:extLst>
               <a:ext uri="{FF2B5EF4-FFF2-40B4-BE49-F238E27FC236}">
@@ -20187,7 +20532,7 @@
 </p:sld>
 </file>
 
-<file path=ppt/slides/slide11.xml><?xml version="1.0" encoding="utf-8"?>
+<file path=ppt/slides/slide12.xml><?xml version="1.0" encoding="utf-8"?>
 <p:sld xmlns:a="http://schemas.openxmlformats.org/drawingml/2006/main" xmlns:r="http://schemas.openxmlformats.org/officeDocument/2006/relationships" xmlns:p="http://schemas.openxmlformats.org/presentationml/2006/main">
   <p:cSld>
     <p:spTree>
@@ -22335,7 +22680,7 @@
             <p:ph idx="1"/>
             <p:extLst>
               <p:ext uri="{D42A27DB-BD31-4B8C-83A1-F6EECF244321}">
-                <p14:modId xmlns:p14="http://schemas.microsoft.com/office/powerpoint/2010/main" val="2905255438"/>
+                <p14:modId xmlns:p14="http://schemas.microsoft.com/office/powerpoint/2010/main" val="2880333694"/>
               </p:ext>
             </p:extLst>
           </p:nvPr>
@@ -22364,6 +22709,227 @@
 </file>
 
 <file path=ppt/slides/slide7.xml><?xml version="1.0" encoding="utf-8"?>
+<p:sld xmlns:a="http://schemas.openxmlformats.org/drawingml/2006/main" xmlns:r="http://schemas.openxmlformats.org/officeDocument/2006/relationships" xmlns:p="http://schemas.openxmlformats.org/presentationml/2006/main">
+  <p:cSld>
+    <p:spTree>
+      <p:nvGrpSpPr>
+        <p:cNvPr id="1" name=""/>
+        <p:cNvGrpSpPr/>
+        <p:nvPr/>
+      </p:nvGrpSpPr>
+      <p:grpSpPr>
+        <a:xfrm>
+          <a:off x="0" y="0"/>
+          <a:ext cx="0" cy="0"/>
+          <a:chOff x="0" y="0"/>
+          <a:chExt cx="0" cy="0"/>
+        </a:xfrm>
+      </p:grpSpPr>
+      <p:sp>
+        <p:nvSpPr>
+          <p:cNvPr id="2" name="Title 1">
+            <a:extLst>
+              <a:ext uri="{FF2B5EF4-FFF2-40B4-BE49-F238E27FC236}">
+                <a16:creationId xmlns:a16="http://schemas.microsoft.com/office/drawing/2014/main" id="{C4823FC1-EFE0-2216-4163-93BF3048997F}"/>
+              </a:ext>
+            </a:extLst>
+          </p:cNvPr>
+          <p:cNvSpPr>
+            <a:spLocks noGrp="1"/>
+          </p:cNvSpPr>
+          <p:nvPr>
+            <p:ph type="title"/>
+          </p:nvPr>
+        </p:nvSpPr>
+        <p:spPr/>
+        <p:txBody>
+          <a:bodyPr/>
+          <a:lstStyle/>
+          <a:p>
+            <a:r>
+              <a:rPr lang="en-US" dirty="0"/>
+              <a:t>The Model</a:t>
+            </a:r>
+          </a:p>
+        </p:txBody>
+      </p:sp>
+      <p:pic>
+        <p:nvPicPr>
+          <p:cNvPr id="5" name="Content Placeholder 4" descr="Text&#10;&#10;Description automatically generated">
+            <a:extLst>
+              <a:ext uri="{FF2B5EF4-FFF2-40B4-BE49-F238E27FC236}">
+                <a16:creationId xmlns:a16="http://schemas.microsoft.com/office/drawing/2014/main" id="{0D7E75E6-D7E6-4DBA-EF7B-A01C23BC8959}"/>
+              </a:ext>
+            </a:extLst>
+          </p:cNvPr>
+          <p:cNvPicPr>
+            <a:picLocks noGrp="1" noChangeAspect="1"/>
+          </p:cNvPicPr>
+          <p:nvPr>
+            <p:ph idx="1"/>
+          </p:nvPr>
+        </p:nvPicPr>
+        <p:blipFill>
+          <a:blip r:embed="rId2"/>
+          <a:stretch>
+            <a:fillRect/>
+          </a:stretch>
+        </p:blipFill>
+        <p:spPr>
+          <a:xfrm>
+            <a:off x="3374049" y="2092722"/>
+            <a:ext cx="4941276" cy="3492222"/>
+          </a:xfrm>
+        </p:spPr>
+      </p:pic>
+      <p:pic>
+        <p:nvPicPr>
+          <p:cNvPr id="7" name="Picture 6">
+            <a:extLst>
+              <a:ext uri="{FF2B5EF4-FFF2-40B4-BE49-F238E27FC236}">
+                <a16:creationId xmlns:a16="http://schemas.microsoft.com/office/drawing/2014/main" id="{7203BAD3-5E18-E4B1-C752-98348972C008}"/>
+              </a:ext>
+            </a:extLst>
+          </p:cNvPr>
+          <p:cNvPicPr>
+            <a:picLocks noChangeAspect="1"/>
+          </p:cNvPicPr>
+          <p:nvPr/>
+        </p:nvPicPr>
+        <p:blipFill>
+          <a:blip r:embed="rId3"/>
+          <a:stretch>
+            <a:fillRect/>
+          </a:stretch>
+        </p:blipFill>
+        <p:spPr>
+          <a:xfrm>
+            <a:off x="1696916" y="5756908"/>
+            <a:ext cx="8295542" cy="774858"/>
+          </a:xfrm>
+          <a:prstGeom prst="rect">
+            <a:avLst/>
+          </a:prstGeom>
+        </p:spPr>
+      </p:pic>
+      <p:sp>
+        <p:nvSpPr>
+          <p:cNvPr id="8" name="Oval 7">
+            <a:extLst>
+              <a:ext uri="{FF2B5EF4-FFF2-40B4-BE49-F238E27FC236}">
+                <a16:creationId xmlns:a16="http://schemas.microsoft.com/office/drawing/2014/main" id="{FF62E351-4E4D-1EF5-77A2-48366F373239}"/>
+              </a:ext>
+            </a:extLst>
+          </p:cNvPr>
+          <p:cNvSpPr/>
+          <p:nvPr/>
+        </p:nvSpPr>
+        <p:spPr>
+          <a:xfrm>
+            <a:off x="4958862" y="5756908"/>
+            <a:ext cx="2061796" cy="476838"/>
+          </a:xfrm>
+          <a:prstGeom prst="ellipse">
+            <a:avLst/>
+          </a:prstGeom>
+          <a:noFill/>
+          <a:ln w="76200">
+            <a:solidFill>
+              <a:schemeClr val="bg2"/>
+            </a:solidFill>
+          </a:ln>
+        </p:spPr>
+        <p:style>
+          <a:lnRef idx="2">
+            <a:schemeClr val="accent1">
+              <a:shade val="50000"/>
+            </a:schemeClr>
+          </a:lnRef>
+          <a:fillRef idx="1">
+            <a:schemeClr val="accent1"/>
+          </a:fillRef>
+          <a:effectRef idx="0">
+            <a:schemeClr val="accent1"/>
+          </a:effectRef>
+          <a:fontRef idx="minor">
+            <a:schemeClr val="lt1"/>
+          </a:fontRef>
+        </p:style>
+        <p:txBody>
+          <a:bodyPr rtlCol="0" anchor="ctr"/>
+          <a:lstStyle/>
+          <a:p>
+            <a:pPr algn="ctr"/>
+            <a:endParaRPr lang="en-US"/>
+          </a:p>
+        </p:txBody>
+      </p:sp>
+      <p:sp>
+        <p:nvSpPr>
+          <p:cNvPr id="9" name="Oval 8">
+            <a:extLst>
+              <a:ext uri="{FF2B5EF4-FFF2-40B4-BE49-F238E27FC236}">
+                <a16:creationId xmlns:a16="http://schemas.microsoft.com/office/drawing/2014/main" id="{2EB1B4B1-7D44-07B4-AF85-3F95D6BB6EAC}"/>
+              </a:ext>
+            </a:extLst>
+          </p:cNvPr>
+          <p:cNvSpPr/>
+          <p:nvPr/>
+        </p:nvSpPr>
+        <p:spPr>
+          <a:xfrm>
+            <a:off x="5961185" y="2800350"/>
+            <a:ext cx="448407" cy="1701312"/>
+          </a:xfrm>
+          <a:prstGeom prst="ellipse">
+            <a:avLst/>
+          </a:prstGeom>
+          <a:noFill/>
+          <a:ln w="76200">
+            <a:solidFill>
+              <a:schemeClr val="bg2"/>
+            </a:solidFill>
+          </a:ln>
+        </p:spPr>
+        <p:style>
+          <a:lnRef idx="2">
+            <a:schemeClr val="accent1">
+              <a:shade val="50000"/>
+            </a:schemeClr>
+          </a:lnRef>
+          <a:fillRef idx="1">
+            <a:schemeClr val="accent1"/>
+          </a:fillRef>
+          <a:effectRef idx="0">
+            <a:schemeClr val="accent1"/>
+          </a:effectRef>
+          <a:fontRef idx="minor">
+            <a:schemeClr val="lt1"/>
+          </a:fontRef>
+        </p:style>
+        <p:txBody>
+          <a:bodyPr rtlCol="0" anchor="ctr"/>
+          <a:lstStyle/>
+          <a:p>
+            <a:pPr algn="ctr"/>
+            <a:endParaRPr lang="en-US"/>
+          </a:p>
+        </p:txBody>
+      </p:sp>
+    </p:spTree>
+    <p:extLst>
+      <p:ext uri="{BB962C8B-B14F-4D97-AF65-F5344CB8AC3E}">
+        <p14:creationId xmlns:p14="http://schemas.microsoft.com/office/powerpoint/2010/main" val="3242644556"/>
+      </p:ext>
+    </p:extLst>
+  </p:cSld>
+  <p:clrMapOvr>
+    <a:masterClrMapping/>
+  </p:clrMapOvr>
+</p:sld>
+</file>
+
+<file path=ppt/slides/slide8.xml><?xml version="1.0" encoding="utf-8"?>
 <p:sld xmlns:a="http://schemas.openxmlformats.org/drawingml/2006/main" xmlns:r="http://schemas.openxmlformats.org/officeDocument/2006/relationships" xmlns:p="http://schemas.openxmlformats.org/presentationml/2006/main">
   <p:cSld>
     <p:bg>
@@ -22517,7 +23083,7 @@
 </p:sld>
 </file>
 
-<file path=ppt/slides/slide8.xml><?xml version="1.0" encoding="utf-8"?>
+<file path=ppt/slides/slide9.xml><?xml version="1.0" encoding="utf-8"?>
 <p:sld xmlns:a="http://schemas.openxmlformats.org/drawingml/2006/main" xmlns:r="http://schemas.openxmlformats.org/officeDocument/2006/relationships" xmlns:p="http://schemas.openxmlformats.org/presentationml/2006/main">
   <p:cSld>
     <p:spTree>
@@ -22653,151 +23219,6 @@
     <p:extLst>
       <p:ext uri="{BB962C8B-B14F-4D97-AF65-F5344CB8AC3E}">
         <p14:creationId xmlns:p14="http://schemas.microsoft.com/office/powerpoint/2010/main" val="2163863868"/>
-      </p:ext>
-    </p:extLst>
-  </p:cSld>
-  <p:clrMapOvr>
-    <a:masterClrMapping/>
-  </p:clrMapOvr>
-</p:sld>
-</file>
-
-<file path=ppt/slides/slide9.xml><?xml version="1.0" encoding="utf-8"?>
-<p:sld xmlns:a="http://schemas.openxmlformats.org/drawingml/2006/main" xmlns:r="http://schemas.openxmlformats.org/officeDocument/2006/relationships" xmlns:p="http://schemas.openxmlformats.org/presentationml/2006/main">
-  <p:cSld>
-    <p:spTree>
-      <p:nvGrpSpPr>
-        <p:cNvPr id="1" name=""/>
-        <p:cNvGrpSpPr/>
-        <p:nvPr/>
-      </p:nvGrpSpPr>
-      <p:grpSpPr>
-        <a:xfrm>
-          <a:off x="0" y="0"/>
-          <a:ext cx="0" cy="0"/>
-          <a:chOff x="0" y="0"/>
-          <a:chExt cx="0" cy="0"/>
-        </a:xfrm>
-      </p:grpSpPr>
-      <p:pic>
-        <p:nvPicPr>
-          <p:cNvPr id="3" name="slide3" descr="Most_Popular_Breweries">
-            <a:extLst>
-              <a:ext uri="{FF2B5EF4-FFF2-40B4-BE49-F238E27FC236}">
-                <a16:creationId xmlns:a16="http://schemas.microsoft.com/office/drawing/2014/main" id="{F23DE759-4EFB-4947-A06B-DBA58F7D0FAF}"/>
-              </a:ext>
-            </a:extLst>
-          </p:cNvPr>
-          <p:cNvPicPr>
-            <a:picLocks noChangeAspect="1"/>
-          </p:cNvPicPr>
-          <p:nvPr/>
-        </p:nvPicPr>
-        <p:blipFill>
-          <a:blip r:embed="rId2">
-            <a:extLst>
-              <a:ext uri="{28A0092B-C50C-407E-A947-70E740481C1C}">
-                <a14:useLocalDpi xmlns:a14="http://schemas.microsoft.com/office/drawing/2010/main" val="0"/>
-              </a:ext>
-            </a:extLst>
-          </a:blip>
-          <a:stretch>
-            <a:fillRect/>
-          </a:stretch>
-        </p:blipFill>
-        <p:spPr>
-          <a:xfrm>
-            <a:off x="0" y="1268135"/>
-            <a:ext cx="12192000" cy="5352473"/>
-          </a:xfrm>
-          <a:prstGeom prst="rect">
-            <a:avLst/>
-          </a:prstGeom>
-        </p:spPr>
-      </p:pic>
-      <p:sp>
-        <p:nvSpPr>
-          <p:cNvPr id="2" name="TextBox 1">
-            <a:extLst>
-              <a:ext uri="{FF2B5EF4-FFF2-40B4-BE49-F238E27FC236}">
-                <a16:creationId xmlns:a16="http://schemas.microsoft.com/office/drawing/2014/main" id="{104ABFC8-8FA2-14D4-CEEB-795D2FF325EB}"/>
-              </a:ext>
-            </a:extLst>
-          </p:cNvPr>
-          <p:cNvSpPr txBox="1"/>
-          <p:nvPr/>
-        </p:nvSpPr>
-        <p:spPr>
-          <a:xfrm>
-            <a:off x="0" y="81454"/>
-            <a:ext cx="6340197" cy="369332"/>
-          </a:xfrm>
-          <a:prstGeom prst="rect">
-            <a:avLst/>
-          </a:prstGeom>
-          <a:noFill/>
-        </p:spPr>
-        <p:txBody>
-          <a:bodyPr wrap="none" rtlCol="0">
-            <a:spAutoFit/>
-          </a:bodyPr>
-          <a:lstStyle/>
-          <a:p>
-            <a:r>
-              <a:rPr lang="en-US" dirty="0">
-                <a:ln w="0"/>
-                <a:effectLst>
-                  <a:outerShdw blurRad="38100" dist="19050" dir="2700000" algn="tl" rotWithShape="0">
-                    <a:schemeClr val="dk1">
-                      <a:alpha val="40000"/>
-                    </a:schemeClr>
-                  </a:outerShdw>
-                </a:effectLst>
-              </a:rPr>
-              <a:t>Most popular Breweries based on reviews from the dataset.</a:t>
-            </a:r>
-          </a:p>
-        </p:txBody>
-      </p:sp>
-      <p:sp>
-        <p:nvSpPr>
-          <p:cNvPr id="4" name="TextBox 3">
-            <a:extLst>
-              <a:ext uri="{FF2B5EF4-FFF2-40B4-BE49-F238E27FC236}">
-                <a16:creationId xmlns:a16="http://schemas.microsoft.com/office/drawing/2014/main" id="{40C78AD8-573B-747A-7846-5474E7BF4A79}"/>
-              </a:ext>
-            </a:extLst>
-          </p:cNvPr>
-          <p:cNvSpPr txBox="1"/>
-          <p:nvPr/>
-        </p:nvSpPr>
-        <p:spPr>
-          <a:xfrm>
-            <a:off x="0" y="651421"/>
-            <a:ext cx="6500191" cy="584775"/>
-          </a:xfrm>
-          <a:prstGeom prst="rect">
-            <a:avLst/>
-          </a:prstGeom>
-          <a:noFill/>
-        </p:spPr>
-        <p:txBody>
-          <a:bodyPr wrap="square" rtlCol="0">
-            <a:spAutoFit/>
-          </a:bodyPr>
-          <a:lstStyle/>
-          <a:p>
-            <a:r>
-              <a:rPr lang="en-US" sz="1600" dirty="0"/>
-              <a:t>Most popular Breweries based on review scores using a 4-5 point scale. Showing the top 25 in this category.</a:t>
-            </a:r>
-          </a:p>
-        </p:txBody>
-      </p:sp>
-    </p:spTree>
-    <p:extLst>
-      <p:ext uri="{BB962C8B-B14F-4D97-AF65-F5344CB8AC3E}">
-        <p14:creationId xmlns:p14="http://schemas.microsoft.com/office/powerpoint/2010/main" val="2238622656"/>
       </p:ext>
     </p:extLst>
   </p:cSld>

</xml_diff>